<commit_message>
modified:   figures/Algorithm_outline.pptx 	modified:   preamble.tex 	modified:   prelims.tex
</commit_message>
<xml_diff>
--- a/figures/Algorithm_outline.pptx
+++ b/figures/Algorithm_outline.pptx
@@ -243,7 +243,7 @@
           <a:p>
             <a:fld id="{FA39FE8A-B5A3-4DD0-871D-56C8518DA090}" type="datetimeFigureOut">
               <a:rPr lang="en-US" smtClean="0"/>
-              <a:t>10/26/2020</a:t>
+              <a:t>10/26/20</a:t>
             </a:fld>
             <a:endParaRPr lang="en-US"/>
           </a:p>
@@ -413,7 +413,7 @@
           <a:p>
             <a:fld id="{FA39FE8A-B5A3-4DD0-871D-56C8518DA090}" type="datetimeFigureOut">
               <a:rPr lang="en-US" smtClean="0"/>
-              <a:t>10/26/2020</a:t>
+              <a:t>10/26/20</a:t>
             </a:fld>
             <a:endParaRPr lang="en-US"/>
           </a:p>
@@ -593,7 +593,7 @@
           <a:p>
             <a:fld id="{FA39FE8A-B5A3-4DD0-871D-56C8518DA090}" type="datetimeFigureOut">
               <a:rPr lang="en-US" smtClean="0"/>
-              <a:t>10/26/2020</a:t>
+              <a:t>10/26/20</a:t>
             </a:fld>
             <a:endParaRPr lang="en-US"/>
           </a:p>
@@ -763,7 +763,7 @@
           <a:p>
             <a:fld id="{FA39FE8A-B5A3-4DD0-871D-56C8518DA090}" type="datetimeFigureOut">
               <a:rPr lang="en-US" smtClean="0"/>
-              <a:t>10/26/2020</a:t>
+              <a:t>10/26/20</a:t>
             </a:fld>
             <a:endParaRPr lang="en-US"/>
           </a:p>
@@ -1009,7 +1009,7 @@
           <a:p>
             <a:fld id="{FA39FE8A-B5A3-4DD0-871D-56C8518DA090}" type="datetimeFigureOut">
               <a:rPr lang="en-US" smtClean="0"/>
-              <a:t>10/26/2020</a:t>
+              <a:t>10/26/20</a:t>
             </a:fld>
             <a:endParaRPr lang="en-US"/>
           </a:p>
@@ -1241,7 +1241,7 @@
           <a:p>
             <a:fld id="{FA39FE8A-B5A3-4DD0-871D-56C8518DA090}" type="datetimeFigureOut">
               <a:rPr lang="en-US" smtClean="0"/>
-              <a:t>10/26/2020</a:t>
+              <a:t>10/26/20</a:t>
             </a:fld>
             <a:endParaRPr lang="en-US"/>
           </a:p>
@@ -1608,7 +1608,7 @@
           <a:p>
             <a:fld id="{FA39FE8A-B5A3-4DD0-871D-56C8518DA090}" type="datetimeFigureOut">
               <a:rPr lang="en-US" smtClean="0"/>
-              <a:t>10/26/2020</a:t>
+              <a:t>10/26/20</a:t>
             </a:fld>
             <a:endParaRPr lang="en-US"/>
           </a:p>
@@ -1726,7 +1726,7 @@
           <a:p>
             <a:fld id="{FA39FE8A-B5A3-4DD0-871D-56C8518DA090}" type="datetimeFigureOut">
               <a:rPr lang="en-US" smtClean="0"/>
-              <a:t>10/26/2020</a:t>
+              <a:t>10/26/20</a:t>
             </a:fld>
             <a:endParaRPr lang="en-US"/>
           </a:p>
@@ -1821,7 +1821,7 @@
           <a:p>
             <a:fld id="{FA39FE8A-B5A3-4DD0-871D-56C8518DA090}" type="datetimeFigureOut">
               <a:rPr lang="en-US" smtClean="0"/>
-              <a:t>10/26/2020</a:t>
+              <a:t>10/26/20</a:t>
             </a:fld>
             <a:endParaRPr lang="en-US"/>
           </a:p>
@@ -2098,7 +2098,7 @@
           <a:p>
             <a:fld id="{FA39FE8A-B5A3-4DD0-871D-56C8518DA090}" type="datetimeFigureOut">
               <a:rPr lang="en-US" smtClean="0"/>
-              <a:t>10/26/2020</a:t>
+              <a:t>10/26/20</a:t>
             </a:fld>
             <a:endParaRPr lang="en-US"/>
           </a:p>
@@ -2355,7 +2355,7 @@
           <a:p>
             <a:fld id="{FA39FE8A-B5A3-4DD0-871D-56C8518DA090}" type="datetimeFigureOut">
               <a:rPr lang="en-US" smtClean="0"/>
-              <a:t>10/26/2020</a:t>
+              <a:t>10/26/20</a:t>
             </a:fld>
             <a:endParaRPr lang="en-US"/>
           </a:p>
@@ -2568,7 +2568,7 @@
           <a:p>
             <a:fld id="{FA39FE8A-B5A3-4DD0-871D-56C8518DA090}" type="datetimeFigureOut">
               <a:rPr lang="en-US" smtClean="0"/>
-              <a:t>10/26/2020</a:t>
+              <a:t>10/26/20</a:t>
             </a:fld>
             <a:endParaRPr lang="en-US"/>
           </a:p>
@@ -2987,7 +2987,7 @@
         </p:nvSpPr>
         <p:spPr>
           <a:xfrm>
-            <a:off x="5433762" y="1386694"/>
+            <a:off x="5458375" y="1429598"/>
             <a:ext cx="2666162" cy="3162379"/>
           </a:xfrm>
           <a:prstGeom prst="rect">
@@ -3232,8 +3232,8 @@
         </p:nvCxnSpPr>
         <p:spPr>
           <a:xfrm>
-            <a:off x="3723273" y="2602906"/>
-            <a:ext cx="2235054" cy="0"/>
+            <a:off x="3746724" y="2419702"/>
+            <a:ext cx="2211603" cy="6354"/>
           </a:xfrm>
           <a:prstGeom prst="straightConnector1">
             <a:avLst/>
@@ -3274,7 +3274,7 @@
         </p:nvSpPr>
         <p:spPr>
           <a:xfrm>
-            <a:off x="5958327" y="2313512"/>
+            <a:off x="5958327" y="2256064"/>
             <a:ext cx="1720607" cy="578786"/>
           </a:xfrm>
           <a:prstGeom prst="rect">
@@ -3347,7 +3347,7 @@
         </p:nvCxnSpPr>
         <p:spPr>
           <a:xfrm>
-            <a:off x="3723273" y="3919790"/>
+            <a:off x="3723273" y="3558332"/>
             <a:ext cx="2235054" cy="0"/>
           </a:xfrm>
           <a:prstGeom prst="straightConnector1">
@@ -3389,7 +3389,7 @@
         </p:nvSpPr>
         <p:spPr>
           <a:xfrm>
-            <a:off x="5958327" y="3630398"/>
+            <a:off x="5958327" y="3268939"/>
             <a:ext cx="1720607" cy="578786"/>
           </a:xfrm>
           <a:prstGeom prst="rect">
@@ -3446,8 +3446,8 @@
           </a:p>
         </p:txBody>
       </p:sp>
-      <mc:AlternateContent xmlns:mc="http://schemas.openxmlformats.org/markup-compatibility/2006">
-        <mc:Choice xmlns:a14="http://schemas.microsoft.com/office/drawing/2010/main" Requires="a14">
+      <mc:AlternateContent xmlns:mc="http://schemas.openxmlformats.org/markup-compatibility/2006" xmlns:a14="http://schemas.microsoft.com/office/drawing/2010/main">
+        <mc:Choice Requires="a14">
           <p:sp>
             <p:nvSpPr>
               <p:cNvPr id="16" name="TextBox 15">
@@ -3519,7 +3519,7 @@
             </p:txBody>
           </p:sp>
         </mc:Choice>
-        <mc:Fallback>
+        <mc:Fallback xmlns="">
           <p:sp>
             <p:nvSpPr>
               <p:cNvPr id="16" name="TextBox 15">
@@ -3578,8 +3578,8 @@
         </p:nvSpPr>
         <p:spPr>
           <a:xfrm rot="16200000">
-            <a:off x="4364968" y="3011483"/>
-            <a:ext cx="399912" cy="342852"/>
+            <a:off x="4246337" y="2540108"/>
+            <a:ext cx="664361" cy="276999"/>
           </a:xfrm>
           <a:prstGeom prst="rect">
             <a:avLst/>
@@ -3587,7 +3587,7 @@
           <a:noFill/>
         </p:spPr>
         <p:txBody>
-          <a:bodyPr wrap="none" lIns="0" tIns="0" rIns="0" bIns="0" rtlCol="0">
+          <a:bodyPr wrap="square" lIns="0" tIns="0" rIns="0" bIns="0" rtlCol="0">
             <a:spAutoFit/>
           </a:bodyPr>
           <a:lstStyle/>
@@ -3616,7 +3616,7 @@
         </p:nvSpPr>
         <p:spPr>
           <a:xfrm rot="16200000">
-            <a:off x="6432152" y="3041552"/>
+            <a:off x="6611838" y="2821679"/>
             <a:ext cx="399912" cy="342852"/>
           </a:xfrm>
           <a:prstGeom prst="rect">
@@ -3654,8 +3654,8 @@
         </p:nvSpPr>
         <p:spPr>
           <a:xfrm>
-            <a:off x="9507207" y="1757902"/>
-            <a:ext cx="297407" cy="2334710"/>
+            <a:off x="9508410" y="1757902"/>
+            <a:ext cx="296204" cy="2050569"/>
           </a:xfrm>
           <a:prstGeom prst="rightBrace">
             <a:avLst>
@@ -3743,8 +3743,8 @@
         </p:nvSpPr>
         <p:spPr>
           <a:xfrm>
-            <a:off x="6978962" y="5300843"/>
-            <a:ext cx="1427638" cy="1333937"/>
+            <a:off x="6560165" y="4050193"/>
+            <a:ext cx="1378450" cy="770215"/>
           </a:xfrm>
           <a:prstGeom prst="diamond">
             <a:avLst/>
@@ -3843,7 +3843,7 @@
             </p:nvSpPr>
             <p:spPr>
               <a:xfrm>
-                <a:off x="4505543" y="2123872"/>
+                <a:off x="4505543" y="2085235"/>
                 <a:ext cx="363882" cy="345523"/>
               </a:xfrm>
               <a:prstGeom prst="rect">
@@ -3917,7 +3917,7 @@
             </p:nvSpPr>
             <p:spPr>
               <a:xfrm>
-                <a:off x="4505543" y="2123872"/>
+                <a:off x="4505543" y="2085235"/>
                 <a:ext cx="363882" cy="345523"/>
               </a:xfrm>
               <a:prstGeom prst="rect">
@@ -3926,7 +3926,7 @@
               <a:blipFill>
                 <a:blip r:embed="rId3"/>
                 <a:stretch>
-                  <a:fillRect l="-5000" b="-1754"/>
+                  <a:fillRect l="-3448" b="-3571"/>
                 </a:stretch>
               </a:blipFill>
             </p:spPr>
@@ -3961,7 +3961,7 @@
             </p:nvSpPr>
             <p:spPr>
               <a:xfrm>
-                <a:off x="4510808" y="3440755"/>
+                <a:off x="4485050" y="3093024"/>
                 <a:ext cx="379201" cy="345523"/>
               </a:xfrm>
               <a:prstGeom prst="rect">
@@ -4035,7 +4035,7 @@
             </p:nvSpPr>
             <p:spPr>
               <a:xfrm>
-                <a:off x="4510808" y="3440755"/>
+                <a:off x="4485050" y="3093024"/>
                 <a:ext cx="379201" cy="345523"/>
               </a:xfrm>
               <a:prstGeom prst="rect">
@@ -4044,7 +4044,7 @@
               <a:blipFill>
                 <a:blip r:embed="rId4"/>
                 <a:stretch>
-                  <a:fillRect l="-4839" b="-1754"/>
+                  <a:fillRect l="-3226" b="-3571"/>
                 </a:stretch>
               </a:blipFill>
             </p:spPr>
@@ -4079,8 +4079,8 @@
             </p:nvSpPr>
             <p:spPr>
               <a:xfrm>
-                <a:off x="5744416" y="6007690"/>
-                <a:ext cx="1799067" cy="307776"/>
+                <a:off x="5576981" y="4038023"/>
+                <a:ext cx="1799067" cy="523220"/>
               </a:xfrm>
               <a:prstGeom prst="rect">
                 <a:avLst/>
@@ -4098,67 +4098,75 @@
                     <a:latin typeface="Arial" panose="020B0604020202020204" pitchFamily="34" charset="0"/>
                     <a:cs typeface="Arial" panose="020B0604020202020204" pitchFamily="34" charset="0"/>
                   </a:rPr>
-                  <a:t>Update </a:t>
+                  <a:t>Update</a:t>
                 </a:r>
+              </a:p>
+              <a:p>
+                <a:pPr/>
                 <a14:m>
-                  <m:oMath xmlns:m="http://schemas.openxmlformats.org/officeDocument/2006/math">
-                    <m:sSub>
-                      <m:sSubPr>
-                        <m:ctrlPr>
-                          <a:rPr lang="en-US" sz="1400" b="0" i="1" smtClean="0">
-                            <a:latin typeface="Cambria Math" panose="02040503050406030204" pitchFamily="18" charset="0"/>
-                          </a:rPr>
-                        </m:ctrlPr>
-                      </m:sSubPr>
-                      <m:e>
-                        <m:r>
-                          <a:rPr lang="en-US" sz="1400" b="0" i="1" smtClean="0">
-                            <a:latin typeface="Cambria Math" panose="02040503050406030204" pitchFamily="18" charset="0"/>
-                          </a:rPr>
-                          <m:t>𝜂</m:t>
-                        </m:r>
-                      </m:e>
-                      <m:sub>
-                        <m:r>
-                          <a:rPr lang="en-US" sz="1400" b="0" i="1" smtClean="0">
-                            <a:latin typeface="Cambria Math" panose="02040503050406030204" pitchFamily="18" charset="0"/>
-                          </a:rPr>
-                          <m:t>𝑥</m:t>
-                        </m:r>
-                      </m:sub>
-                    </m:sSub>
-                    <m:r>
-                      <a:rPr lang="en-US" sz="1400" b="0" i="0" smtClean="0">
-                        <a:latin typeface="Cambria Math" panose="02040503050406030204" pitchFamily="18" charset="0"/>
-                      </a:rPr>
-                      <m:t>,</m:t>
-                    </m:r>
-                    <m:sSub>
-                      <m:sSubPr>
-                        <m:ctrlPr>
-                          <a:rPr lang="en-US" sz="1400" b="0" i="1" smtClean="0">
-                            <a:latin typeface="Cambria Math" panose="02040503050406030204" pitchFamily="18" charset="0"/>
-                          </a:rPr>
-                        </m:ctrlPr>
-                      </m:sSubPr>
-                      <m:e>
-                        <m:r>
-                          <a:rPr lang="en-US" sz="1400" b="0" i="1" smtClean="0">
-                            <a:latin typeface="Cambria Math" panose="02040503050406030204" pitchFamily="18" charset="0"/>
-                          </a:rPr>
-                          <m:t>𝜂</m:t>
-                        </m:r>
-                      </m:e>
-                      <m:sub>
-                        <m:r>
-                          <a:rPr lang="en-US" sz="1400" b="0" i="1" smtClean="0">
-                            <a:latin typeface="Cambria Math" panose="02040503050406030204" pitchFamily="18" charset="0"/>
-                          </a:rPr>
-                          <m:t>𝑢</m:t>
-                        </m:r>
-                      </m:sub>
-                    </m:sSub>
-                  </m:oMath>
+                  <m:oMathPara xmlns:m="http://schemas.openxmlformats.org/officeDocument/2006/math">
+                    <m:oMathParaPr>
+                      <m:jc m:val="left"/>
+                    </m:oMathParaPr>
+                    <m:oMath xmlns:m="http://schemas.openxmlformats.org/officeDocument/2006/math">
+                      <m:sSub>
+                        <m:sSubPr>
+                          <m:ctrlPr>
+                            <a:rPr lang="en-US" sz="1400" b="0" i="1" smtClean="0">
+                              <a:latin typeface="Cambria Math" panose="02040503050406030204" pitchFamily="18" charset="0"/>
+                            </a:rPr>
+                          </m:ctrlPr>
+                        </m:sSubPr>
+                        <m:e>
+                          <m:r>
+                            <a:rPr lang="en-US" sz="1400" b="0" i="1" smtClean="0">
+                              <a:latin typeface="Cambria Math" panose="02040503050406030204" pitchFamily="18" charset="0"/>
+                            </a:rPr>
+                            <m:t>𝜂</m:t>
+                          </m:r>
+                        </m:e>
+                        <m:sub>
+                          <m:r>
+                            <a:rPr lang="en-US" sz="1400" b="0" i="1" smtClean="0">
+                              <a:latin typeface="Cambria Math" panose="02040503050406030204" pitchFamily="18" charset="0"/>
+                            </a:rPr>
+                            <m:t>𝑥</m:t>
+                          </m:r>
+                        </m:sub>
+                      </m:sSub>
+                      <m:r>
+                        <a:rPr lang="en-US" sz="1400" b="0" i="0" smtClean="0">
+                          <a:latin typeface="Cambria Math" panose="02040503050406030204" pitchFamily="18" charset="0"/>
+                        </a:rPr>
+                        <m:t>,</m:t>
+                      </m:r>
+                      <m:sSub>
+                        <m:sSubPr>
+                          <m:ctrlPr>
+                            <a:rPr lang="en-US" sz="1400" b="0" i="1" smtClean="0">
+                              <a:latin typeface="Cambria Math" panose="02040503050406030204" pitchFamily="18" charset="0"/>
+                            </a:rPr>
+                          </m:ctrlPr>
+                        </m:sSubPr>
+                        <m:e>
+                          <m:r>
+                            <a:rPr lang="en-US" sz="1400" b="0" i="1" smtClean="0">
+                              <a:latin typeface="Cambria Math" panose="02040503050406030204" pitchFamily="18" charset="0"/>
+                            </a:rPr>
+                            <m:t>𝜂</m:t>
+                          </m:r>
+                        </m:e>
+                        <m:sub>
+                          <m:r>
+                            <a:rPr lang="en-US" sz="1400" b="0" i="1" smtClean="0">
+                              <a:latin typeface="Cambria Math" panose="02040503050406030204" pitchFamily="18" charset="0"/>
+                            </a:rPr>
+                            <m:t>𝑢</m:t>
+                          </m:r>
+                        </m:sub>
+                      </m:sSub>
+                    </m:oMath>
+                  </m:oMathPara>
                 </a14:m>
                 <a:endParaRPr lang="en-US" sz="1400" dirty="0">
                   <a:latin typeface="Arial" panose="020B0604020202020204" pitchFamily="34" charset="0"/>
@@ -4185,8 +4193,8 @@
             </p:nvSpPr>
             <p:spPr>
               <a:xfrm>
-                <a:off x="5744416" y="6007690"/>
-                <a:ext cx="1799067" cy="307776"/>
+                <a:off x="5576981" y="4038023"/>
+                <a:ext cx="1799067" cy="523220"/>
               </a:xfrm>
               <a:prstGeom prst="rect">
                 <a:avLst/>
@@ -4194,7 +4202,7 @@
               <a:blipFill>
                 <a:blip r:embed="rId5"/>
                 <a:stretch>
-                  <a:fillRect l="-1017" t="-4000" b="-20000"/>
+                  <a:fillRect l="-699" b="-2381"/>
                 </a:stretch>
               </a:blipFill>
             </p:spPr>
@@ -4301,8 +4309,8 @@
           </a:fontRef>
         </p:style>
       </p:cxnSp>
-      <mc:AlternateContent xmlns:mc="http://schemas.openxmlformats.org/markup-compatibility/2006">
-        <mc:Choice xmlns:a14="http://schemas.microsoft.com/office/drawing/2010/main" Requires="a14">
+      <mc:AlternateContent xmlns:mc="http://schemas.openxmlformats.org/markup-compatibility/2006" xmlns:a14="http://schemas.microsoft.com/office/drawing/2010/main">
+        <mc:Choice Requires="a14">
           <p:sp>
             <p:nvSpPr>
               <p:cNvPr id="93" name="TextBox 92">
@@ -4423,7 +4431,7 @@
             </p:txBody>
           </p:sp>
         </mc:Choice>
-        <mc:Fallback>
+        <mc:Fallback xmlns="">
           <p:sp>
             <p:nvSpPr>
               <p:cNvPr id="93" name="TextBox 92">
@@ -4468,8 +4476,8 @@
           </p:sp>
         </mc:Fallback>
       </mc:AlternateContent>
-      <mc:AlternateContent xmlns:mc="http://schemas.openxmlformats.org/markup-compatibility/2006">
-        <mc:Choice xmlns:a14="http://schemas.microsoft.com/office/drawing/2010/main" Requires="a14">
+      <mc:AlternateContent xmlns:mc="http://schemas.openxmlformats.org/markup-compatibility/2006" xmlns:a14="http://schemas.microsoft.com/office/drawing/2010/main">
+        <mc:Choice Requires="a14">
           <p:sp>
             <p:nvSpPr>
               <p:cNvPr id="97" name="TextBox 96">
@@ -4526,7 +4534,7 @@
             </p:txBody>
           </p:sp>
         </mc:Choice>
-        <mc:Fallback>
+        <mc:Fallback xmlns="">
           <p:sp>
             <p:nvSpPr>
               <p:cNvPr id="97" name="TextBox 96">
@@ -4615,8 +4623,8 @@
           </a:fontRef>
         </p:style>
       </p:cxnSp>
-      <mc:AlternateContent xmlns:mc="http://schemas.openxmlformats.org/markup-compatibility/2006">
-        <mc:Choice xmlns:a14="http://schemas.microsoft.com/office/drawing/2010/main" Requires="a14">
+      <mc:AlternateContent xmlns:mc="http://schemas.openxmlformats.org/markup-compatibility/2006" xmlns:a14="http://schemas.microsoft.com/office/drawing/2010/main">
+        <mc:Choice Requires="a14">
           <p:sp>
             <p:nvSpPr>
               <p:cNvPr id="99" name="TextBox 98">
@@ -4737,7 +4745,7 @@
             </p:txBody>
           </p:sp>
         </mc:Choice>
-        <mc:Fallback>
+        <mc:Fallback xmlns="">
           <p:sp>
             <p:nvSpPr>
               <p:cNvPr id="99" name="TextBox 98">
@@ -4875,13 +4883,14 @@
           </p:cNvPr>
           <p:cNvCxnSpPr>
             <a:cxnSpLocks/>
+            <a:stCxn id="13" idx="3"/>
           </p:cNvCxnSpPr>
           <p:nvPr/>
         </p:nvCxnSpPr>
         <p:spPr>
           <a:xfrm>
-            <a:off x="7692781" y="2600466"/>
-            <a:ext cx="1289075" cy="0"/>
+            <a:off x="7678934" y="2545457"/>
+            <a:ext cx="1184709" cy="6543"/>
           </a:xfrm>
           <a:prstGeom prst="straightConnector1">
             <a:avLst/>
@@ -4924,7 +4933,7 @@
         </p:nvCxnSpPr>
         <p:spPr>
           <a:xfrm>
-            <a:off x="7692781" y="3917351"/>
+            <a:off x="7678934" y="3558332"/>
             <a:ext cx="1289075" cy="0"/>
           </a:xfrm>
           <a:prstGeom prst="straightConnector1">
@@ -4952,8 +4961,8 @@
           </a:fontRef>
         </p:style>
       </p:cxnSp>
-      <mc:AlternateContent xmlns:mc="http://schemas.openxmlformats.org/markup-compatibility/2006">
-        <mc:Choice xmlns:a14="http://schemas.microsoft.com/office/drawing/2010/main" Requires="a14">
+      <mc:AlternateContent xmlns:mc="http://schemas.openxmlformats.org/markup-compatibility/2006" xmlns:a14="http://schemas.microsoft.com/office/drawing/2010/main">
+        <mc:Choice Requires="a14">
           <p:sp>
             <p:nvSpPr>
               <p:cNvPr id="37" name="TextBox 36">
@@ -5025,7 +5034,7 @@
             </p:txBody>
           </p:sp>
         </mc:Choice>
-        <mc:Fallback>
+        <mc:Fallback xmlns="">
           <p:sp>
             <p:nvSpPr>
               <p:cNvPr id="37" name="TextBox 36">
@@ -5084,7 +5093,7 @@
         </p:nvSpPr>
         <p:spPr>
           <a:xfrm rot="16200000">
-            <a:off x="8894152" y="3345951"/>
+            <a:off x="8939479" y="2931886"/>
             <a:ext cx="399912" cy="342852"/>
           </a:xfrm>
           <a:prstGeom prst="rect">
@@ -5124,7 +5133,7 @@
             </p:nvSpPr>
             <p:spPr>
               <a:xfrm>
-                <a:off x="9034727" y="2458339"/>
+                <a:off x="9034726" y="2351926"/>
                 <a:ext cx="363882" cy="345523"/>
               </a:xfrm>
               <a:prstGeom prst="rect">
@@ -5198,7 +5207,7 @@
             </p:nvSpPr>
             <p:spPr>
               <a:xfrm>
-                <a:off x="9034727" y="2458339"/>
+                <a:off x="9034726" y="2351926"/>
                 <a:ext cx="363882" cy="345523"/>
               </a:xfrm>
               <a:prstGeom prst="rect">
@@ -5207,7 +5216,7 @@
               <a:blipFill>
                 <a:blip r:embed="rId10"/>
                 <a:stretch>
-                  <a:fillRect l="-3333"/>
+                  <a:fillRect/>
                 </a:stretch>
               </a:blipFill>
             </p:spPr>
@@ -5242,7 +5251,7 @@
             </p:nvSpPr>
             <p:spPr>
               <a:xfrm>
-                <a:off x="9039992" y="3775223"/>
+                <a:off x="9024885" y="3438547"/>
                 <a:ext cx="383565" cy="345523"/>
               </a:xfrm>
               <a:prstGeom prst="rect">
@@ -5316,7 +5325,7 @@
             </p:nvSpPr>
             <p:spPr>
               <a:xfrm>
-                <a:off x="9039992" y="3775223"/>
+                <a:off x="9024885" y="3438547"/>
                 <a:ext cx="383565" cy="345523"/>
               </a:xfrm>
               <a:prstGeom prst="rect">
@@ -5325,7 +5334,7 @@
               <a:blipFill>
                 <a:blip r:embed="rId11"/>
                 <a:stretch>
-                  <a:fillRect l="-4762"/>
+                  <a:fillRect l="-3226"/>
                 </a:stretch>
               </a:blipFill>
             </p:spPr>
@@ -5358,7 +5367,7 @@
         </p:nvSpPr>
         <p:spPr>
           <a:xfrm>
-            <a:off x="2368969" y="5331440"/>
+            <a:off x="2351938" y="4887979"/>
             <a:ext cx="1427638" cy="1333937"/>
           </a:xfrm>
           <a:prstGeom prst="diamond">
@@ -5452,14 +5461,15 @@
             </a:extLst>
           </p:cNvPr>
           <p:cNvCxnSpPr>
+            <a:cxnSpLocks/>
             <a:endCxn id="52" idx="0"/>
           </p:cNvCxnSpPr>
           <p:nvPr/>
         </p:nvCxnSpPr>
         <p:spPr>
           <a:xfrm>
-            <a:off x="7692781" y="4549073"/>
-            <a:ext cx="0" cy="751769"/>
+            <a:off x="7249390" y="3847725"/>
+            <a:ext cx="0" cy="202468"/>
           </a:xfrm>
           <a:prstGeom prst="line">
             <a:avLst/>
@@ -5502,8 +5512,8 @@
         </p:nvCxnSpPr>
         <p:spPr>
           <a:xfrm rot="10800000">
-            <a:off x="5793345" y="4590228"/>
-            <a:ext cx="1185617" cy="1377585"/>
+            <a:off x="6254193" y="3808471"/>
+            <a:ext cx="305973" cy="626830"/>
           </a:xfrm>
           <a:prstGeom prst="bentConnector2">
             <a:avLst/>
@@ -5539,13 +5549,16 @@
               </a:ext>
             </a:extLst>
           </p:cNvPr>
-          <p:cNvCxnSpPr/>
+          <p:cNvCxnSpPr>
+            <a:cxnSpLocks/>
+            <a:endCxn id="6" idx="0"/>
+          </p:cNvCxnSpPr>
           <p:nvPr/>
         </p:nvCxnSpPr>
         <p:spPr>
           <a:xfrm>
-            <a:off x="3082789" y="4579670"/>
-            <a:ext cx="0" cy="751769"/>
+            <a:off x="3055320" y="4591977"/>
+            <a:ext cx="10437" cy="296002"/>
           </a:xfrm>
           <a:prstGeom prst="line">
             <a:avLst/>
@@ -5580,16 +5593,21 @@
               </a:ext>
             </a:extLst>
           </p:cNvPr>
-          <p:cNvCxnSpPr/>
+          <p:cNvCxnSpPr>
+            <a:cxnSpLocks/>
+            <a:stCxn id="6" idx="1"/>
+          </p:cNvCxnSpPr>
           <p:nvPr/>
         </p:nvCxnSpPr>
         <p:spPr>
           <a:xfrm rot="10800000">
-            <a:off x="1331302" y="4579670"/>
-            <a:ext cx="1020635" cy="1418738"/>
+            <a:off x="1331306" y="4579670"/>
+            <a:ext cx="1020633" cy="975278"/>
           </a:xfrm>
-          <a:prstGeom prst="bentConnector2">
-            <a:avLst/>
+          <a:prstGeom prst="bentConnector3">
+            <a:avLst>
+              <a:gd name="adj1" fmla="val 101195"/>
+            </a:avLst>
           </a:prstGeom>
           <a:ln w="25400">
             <a:solidFill>
@@ -5629,7 +5647,7 @@
             </p:nvSpPr>
             <p:spPr>
               <a:xfrm>
-                <a:off x="1454082" y="6024566"/>
+                <a:off x="1324690" y="5644310"/>
                 <a:ext cx="1717171" cy="307776"/>
               </a:xfrm>
               <a:prstGeom prst="rect">
@@ -5686,7 +5704,7 @@
             </p:nvSpPr>
             <p:spPr>
               <a:xfrm>
-                <a:off x="1454082" y="6024566"/>
+                <a:off x="1324690" y="5644310"/>
                 <a:ext cx="1717171" cy="307776"/>
               </a:xfrm>
               <a:prstGeom prst="rect">
@@ -5695,7 +5713,7 @@
               <a:blipFill>
                 <a:blip r:embed="rId12"/>
                 <a:stretch>
-                  <a:fillRect l="-1068" t="-1961" b="-19608"/>
+                  <a:fillRect l="-730" t="-4000" b="-16000"/>
                 </a:stretch>
               </a:blipFill>
             </p:spPr>
@@ -5758,8 +5776,8 @@
           </a:fontRef>
         </p:style>
       </p:cxnSp>
-      <mc:AlternateContent xmlns:mc="http://schemas.openxmlformats.org/markup-compatibility/2006">
-        <mc:Choice xmlns:a14="http://schemas.microsoft.com/office/drawing/2010/main" Requires="a14">
+      <mc:AlternateContent xmlns:mc="http://schemas.openxmlformats.org/markup-compatibility/2006" xmlns:a14="http://schemas.microsoft.com/office/drawing/2010/main">
+        <mc:Choice Requires="a14">
           <p:sp>
             <p:nvSpPr>
               <p:cNvPr id="44" name="TextBox 43">
@@ -5813,7 +5831,7 @@
             </p:txBody>
           </p:sp>
         </mc:Choice>
-        <mc:Fallback>
+        <mc:Fallback xmlns="">
           <p:sp>
             <p:nvSpPr>
               <p:cNvPr id="44" name="TextBox 43">
@@ -5858,6 +5876,51 @@
           </p:sp>
         </mc:Fallback>
       </mc:AlternateContent>
+      <p:cxnSp>
+        <p:nvCxnSpPr>
+          <p:cNvPr id="29" name="Elbow Connector 28">
+            <a:extLst>
+              <a:ext uri="{FF2B5EF4-FFF2-40B4-BE49-F238E27FC236}">
+                <a16:creationId xmlns:a16="http://schemas.microsoft.com/office/drawing/2014/main" id="{21CA0DAA-F93D-D44B-9B0F-EE3FF2B055D5}"/>
+              </a:ext>
+            </a:extLst>
+          </p:cNvPr>
+          <p:cNvCxnSpPr>
+            <a:cxnSpLocks/>
+            <a:stCxn id="52" idx="2"/>
+            <a:endCxn id="6" idx="3"/>
+          </p:cNvCxnSpPr>
+          <p:nvPr/>
+        </p:nvCxnSpPr>
+        <p:spPr>
+          <a:xfrm rot="5400000">
+            <a:off x="5147213" y="3452771"/>
+            <a:ext cx="734540" cy="3469814"/>
+          </a:xfrm>
+          <a:prstGeom prst="bentConnector2">
+            <a:avLst/>
+          </a:prstGeom>
+          <a:ln w="25400">
+            <a:solidFill>
+              <a:schemeClr val="tx1"/>
+            </a:solidFill>
+          </a:ln>
+        </p:spPr>
+        <p:style>
+          <a:lnRef idx="1">
+            <a:schemeClr val="accent1"/>
+          </a:lnRef>
+          <a:fillRef idx="0">
+            <a:schemeClr val="accent1"/>
+          </a:fillRef>
+          <a:effectRef idx="0">
+            <a:schemeClr val="accent1"/>
+          </a:effectRef>
+          <a:fontRef idx="minor">
+            <a:schemeClr val="tx1"/>
+          </a:fontRef>
+        </p:style>
+      </p:cxnSp>
     </p:spTree>
     <p:extLst>
       <p:ext uri="{BB962C8B-B14F-4D97-AF65-F5344CB8AC3E}">

</xml_diff>

<commit_message>
modified:   experiments.tex 	modified:   figures/Algorithm_outline.pdf 	modified:   figures/Algorithm_outline.pptx 	modified:   references.bib
</commit_message>
<xml_diff>
--- a/figures/Algorithm_outline.pptx
+++ b/figures/Algorithm_outline.pptx
@@ -243,7 +243,7 @@
           <a:p>
             <a:fld id="{FA39FE8A-B5A3-4DD0-871D-56C8518DA090}" type="datetimeFigureOut">
               <a:rPr lang="en-US" smtClean="0"/>
-              <a:t>10/26/20</a:t>
+              <a:t>10/27/20</a:t>
             </a:fld>
             <a:endParaRPr lang="en-US"/>
           </a:p>
@@ -413,7 +413,7 @@
           <a:p>
             <a:fld id="{FA39FE8A-B5A3-4DD0-871D-56C8518DA090}" type="datetimeFigureOut">
               <a:rPr lang="en-US" smtClean="0"/>
-              <a:t>10/26/20</a:t>
+              <a:t>10/27/20</a:t>
             </a:fld>
             <a:endParaRPr lang="en-US"/>
           </a:p>
@@ -593,7 +593,7 @@
           <a:p>
             <a:fld id="{FA39FE8A-B5A3-4DD0-871D-56C8518DA090}" type="datetimeFigureOut">
               <a:rPr lang="en-US" smtClean="0"/>
-              <a:t>10/26/20</a:t>
+              <a:t>10/27/20</a:t>
             </a:fld>
             <a:endParaRPr lang="en-US"/>
           </a:p>
@@ -763,7 +763,7 @@
           <a:p>
             <a:fld id="{FA39FE8A-B5A3-4DD0-871D-56C8518DA090}" type="datetimeFigureOut">
               <a:rPr lang="en-US" smtClean="0"/>
-              <a:t>10/26/20</a:t>
+              <a:t>10/27/20</a:t>
             </a:fld>
             <a:endParaRPr lang="en-US"/>
           </a:p>
@@ -1009,7 +1009,7 @@
           <a:p>
             <a:fld id="{FA39FE8A-B5A3-4DD0-871D-56C8518DA090}" type="datetimeFigureOut">
               <a:rPr lang="en-US" smtClean="0"/>
-              <a:t>10/26/20</a:t>
+              <a:t>10/27/20</a:t>
             </a:fld>
             <a:endParaRPr lang="en-US"/>
           </a:p>
@@ -1241,7 +1241,7 @@
           <a:p>
             <a:fld id="{FA39FE8A-B5A3-4DD0-871D-56C8518DA090}" type="datetimeFigureOut">
               <a:rPr lang="en-US" smtClean="0"/>
-              <a:t>10/26/20</a:t>
+              <a:t>10/27/20</a:t>
             </a:fld>
             <a:endParaRPr lang="en-US"/>
           </a:p>
@@ -1608,7 +1608,7 @@
           <a:p>
             <a:fld id="{FA39FE8A-B5A3-4DD0-871D-56C8518DA090}" type="datetimeFigureOut">
               <a:rPr lang="en-US" smtClean="0"/>
-              <a:t>10/26/20</a:t>
+              <a:t>10/27/20</a:t>
             </a:fld>
             <a:endParaRPr lang="en-US"/>
           </a:p>
@@ -1726,7 +1726,7 @@
           <a:p>
             <a:fld id="{FA39FE8A-B5A3-4DD0-871D-56C8518DA090}" type="datetimeFigureOut">
               <a:rPr lang="en-US" smtClean="0"/>
-              <a:t>10/26/20</a:t>
+              <a:t>10/27/20</a:t>
             </a:fld>
             <a:endParaRPr lang="en-US"/>
           </a:p>
@@ -1821,7 +1821,7 @@
           <a:p>
             <a:fld id="{FA39FE8A-B5A3-4DD0-871D-56C8518DA090}" type="datetimeFigureOut">
               <a:rPr lang="en-US" smtClean="0"/>
-              <a:t>10/26/20</a:t>
+              <a:t>10/27/20</a:t>
             </a:fld>
             <a:endParaRPr lang="en-US"/>
           </a:p>
@@ -2098,7 +2098,7 @@
           <a:p>
             <a:fld id="{FA39FE8A-B5A3-4DD0-871D-56C8518DA090}" type="datetimeFigureOut">
               <a:rPr lang="en-US" smtClean="0"/>
-              <a:t>10/26/20</a:t>
+              <a:t>10/27/20</a:t>
             </a:fld>
             <a:endParaRPr lang="en-US"/>
           </a:p>
@@ -2355,7 +2355,7 @@
           <a:p>
             <a:fld id="{FA39FE8A-B5A3-4DD0-871D-56C8518DA090}" type="datetimeFigureOut">
               <a:rPr lang="en-US" smtClean="0"/>
-              <a:t>10/26/20</a:t>
+              <a:t>10/27/20</a:t>
             </a:fld>
             <a:endParaRPr lang="en-US"/>
           </a:p>
@@ -2568,7 +2568,7 @@
           <a:p>
             <a:fld id="{FA39FE8A-B5A3-4DD0-871D-56C8518DA090}" type="datetimeFigureOut">
               <a:rPr lang="en-US" smtClean="0"/>
-              <a:t>10/26/20</a:t>
+              <a:t>10/27/20</a:t>
             </a:fld>
             <a:endParaRPr lang="en-US"/>
           </a:p>
@@ -3827,8 +3827,8 @@
           </a:p>
         </p:txBody>
       </p:sp>
-      <mc:AlternateContent xmlns:mc="http://schemas.openxmlformats.org/markup-compatibility/2006">
-        <mc:Choice xmlns:a14="http://schemas.microsoft.com/office/drawing/2010/main" Requires="a14">
+      <mc:AlternateContent xmlns:mc="http://schemas.openxmlformats.org/markup-compatibility/2006" xmlns:a14="http://schemas.microsoft.com/office/drawing/2010/main">
+        <mc:Choice Requires="a14">
           <p:sp>
             <p:nvSpPr>
               <p:cNvPr id="56" name="TextBox 55">
@@ -3900,7 +3900,7 @@
             </p:txBody>
           </p:sp>
         </mc:Choice>
-        <mc:Fallback>
+        <mc:Fallback xmlns="">
           <p:sp>
             <p:nvSpPr>
               <p:cNvPr id="56" name="TextBox 55">
@@ -3945,8 +3945,8 @@
           </p:sp>
         </mc:Fallback>
       </mc:AlternateContent>
-      <mc:AlternateContent xmlns:mc="http://schemas.openxmlformats.org/markup-compatibility/2006">
-        <mc:Choice xmlns:a14="http://schemas.microsoft.com/office/drawing/2010/main" Requires="a14">
+      <mc:AlternateContent xmlns:mc="http://schemas.openxmlformats.org/markup-compatibility/2006" xmlns:a14="http://schemas.microsoft.com/office/drawing/2010/main">
+        <mc:Choice Requires="a14">
           <p:sp>
             <p:nvSpPr>
               <p:cNvPr id="58" name="TextBox 57">
@@ -4018,7 +4018,7 @@
             </p:txBody>
           </p:sp>
         </mc:Choice>
-        <mc:Fallback>
+        <mc:Fallback xmlns="">
           <p:sp>
             <p:nvSpPr>
               <p:cNvPr id="58" name="TextBox 57">
@@ -4063,8 +4063,8 @@
           </p:sp>
         </mc:Fallback>
       </mc:AlternateContent>
-      <mc:AlternateContent xmlns:mc="http://schemas.openxmlformats.org/markup-compatibility/2006">
-        <mc:Choice xmlns:a14="http://schemas.microsoft.com/office/drawing/2010/main" Requires="a14">
+      <mc:AlternateContent xmlns:mc="http://schemas.openxmlformats.org/markup-compatibility/2006" xmlns:a14="http://schemas.microsoft.com/office/drawing/2010/main">
+        <mc:Choice Requires="a14">
           <p:sp>
             <p:nvSpPr>
               <p:cNvPr id="67" name="TextBox 66">
@@ -4176,7 +4176,7 @@
             </p:txBody>
           </p:sp>
         </mc:Choice>
-        <mc:Fallback>
+        <mc:Fallback xmlns="">
           <p:sp>
             <p:nvSpPr>
               <p:cNvPr id="67" name="TextBox 66">
@@ -5117,8 +5117,8 @@
           </a:p>
         </p:txBody>
       </p:sp>
-      <mc:AlternateContent xmlns:mc="http://schemas.openxmlformats.org/markup-compatibility/2006">
-        <mc:Choice xmlns:a14="http://schemas.microsoft.com/office/drawing/2010/main" Requires="a14">
+      <mc:AlternateContent xmlns:mc="http://schemas.openxmlformats.org/markup-compatibility/2006" xmlns:a14="http://schemas.microsoft.com/office/drawing/2010/main">
+        <mc:Choice Requires="a14">
           <p:sp>
             <p:nvSpPr>
               <p:cNvPr id="41" name="TextBox 40">
@@ -5190,7 +5190,7 @@
             </p:txBody>
           </p:sp>
         </mc:Choice>
-        <mc:Fallback>
+        <mc:Fallback xmlns="">
           <p:sp>
             <p:nvSpPr>
               <p:cNvPr id="41" name="TextBox 40">
@@ -5235,8 +5235,8 @@
           </p:sp>
         </mc:Fallback>
       </mc:AlternateContent>
-      <mc:AlternateContent xmlns:mc="http://schemas.openxmlformats.org/markup-compatibility/2006">
-        <mc:Choice xmlns:a14="http://schemas.microsoft.com/office/drawing/2010/main" Requires="a14">
+      <mc:AlternateContent xmlns:mc="http://schemas.openxmlformats.org/markup-compatibility/2006" xmlns:a14="http://schemas.microsoft.com/office/drawing/2010/main">
+        <mc:Choice Requires="a14">
           <p:sp>
             <p:nvSpPr>
               <p:cNvPr id="42" name="TextBox 41">
@@ -5308,7 +5308,7 @@
             </p:txBody>
           </p:sp>
         </mc:Choice>
-        <mc:Fallback>
+        <mc:Fallback xmlns="">
           <p:sp>
             <p:nvSpPr>
               <p:cNvPr id="42" name="TextBox 41">
@@ -5647,7 +5647,7 @@
             </p:nvSpPr>
             <p:spPr>
               <a:xfrm>
-                <a:off x="1324690" y="5644310"/>
+                <a:off x="1338149" y="5221047"/>
                 <a:ext cx="1717171" cy="307776"/>
               </a:xfrm>
               <a:prstGeom prst="rect">
@@ -5704,7 +5704,7 @@
             </p:nvSpPr>
             <p:spPr>
               <a:xfrm>
-                <a:off x="1324690" y="5644310"/>
+                <a:off x="1338149" y="5221047"/>
                 <a:ext cx="1717171" cy="307776"/>
               </a:xfrm>
               <a:prstGeom prst="rect">
@@ -5713,7 +5713,7 @@
               <a:blipFill>
                 <a:blip r:embed="rId12"/>
                 <a:stretch>
-                  <a:fillRect l="-730" t="-4000" b="-16000"/>
+                  <a:fillRect l="-730" b="-20000"/>
                 </a:stretch>
               </a:blipFill>
             </p:spPr>

</xml_diff>